<commit_message>
Updated the network topology for SG-SG asociation from application ELB to K8S nodes
</commit_message>
<xml_diff>
--- a/Images/K8S.pptx
+++ b/Images/K8S.pptx
@@ -6,6 +6,7 @@
   </p:sldMasterIdLst>
   <p:sldIdLst>
     <p:sldId id="256" r:id="rId2"/>
+    <p:sldId id="257" r:id="rId3"/>
   </p:sldIdLst>
   <p:sldSz cx="12192000" cy="6858000"/>
   <p:notesSz cx="6858000" cy="9144000"/>
@@ -129,7 +130,7 @@
           <p:cNvPr id="2" name="Title 1">
             <a:extLst>
               <a:ext uri="{FF2B5EF4-FFF2-40B4-BE49-F238E27FC236}">
-                <a16:creationId xmlns:a16="http://schemas.microsoft.com/office/drawing/2014/main" id="{CBCCF41C-9D6D-A746-A46A-D6274B694227}"/>
+                <a16:creationId xmlns:a16="http://schemas.microsoft.com/office/drawing/2014/main" xmlns="" id="{CBCCF41C-9D6D-A746-A46A-D6274B694227}"/>
               </a:ext>
             </a:extLst>
           </p:cNvPr>
@@ -166,7 +167,7 @@
           <p:cNvPr id="3" name="Subtitle 2">
             <a:extLst>
               <a:ext uri="{FF2B5EF4-FFF2-40B4-BE49-F238E27FC236}">
-                <a16:creationId xmlns:a16="http://schemas.microsoft.com/office/drawing/2014/main" id="{3D418AEB-0FA8-F747-A8CD-520D779E4B78}"/>
+                <a16:creationId xmlns:a16="http://schemas.microsoft.com/office/drawing/2014/main" xmlns="" id="{3D418AEB-0FA8-F747-A8CD-520D779E4B78}"/>
               </a:ext>
             </a:extLst>
           </p:cNvPr>
@@ -236,7 +237,7 @@
           <p:cNvPr id="4" name="Date Placeholder 3">
             <a:extLst>
               <a:ext uri="{FF2B5EF4-FFF2-40B4-BE49-F238E27FC236}">
-                <a16:creationId xmlns:a16="http://schemas.microsoft.com/office/drawing/2014/main" id="{360F210F-19CA-144C-99A2-379A3CFC4280}"/>
+                <a16:creationId xmlns:a16="http://schemas.microsoft.com/office/drawing/2014/main" xmlns="" id="{360F210F-19CA-144C-99A2-379A3CFC4280}"/>
               </a:ext>
             </a:extLst>
           </p:cNvPr>
@@ -254,7 +255,7 @@
           <a:p>
             <a:fld id="{69D69815-00FB-4E43-BAAC-A06AD43838EF}" type="datetimeFigureOut">
               <a:rPr lang="en-US" smtClean="0"/>
-              <a:t>3/25/18</a:t>
+              <a:t>30/3/18</a:t>
             </a:fld>
             <a:endParaRPr lang="en-US"/>
           </a:p>
@@ -265,7 +266,7 @@
           <p:cNvPr id="5" name="Footer Placeholder 4">
             <a:extLst>
               <a:ext uri="{FF2B5EF4-FFF2-40B4-BE49-F238E27FC236}">
-                <a16:creationId xmlns:a16="http://schemas.microsoft.com/office/drawing/2014/main" id="{350E87B3-4D53-5844-8D63-84DBE1A22125}"/>
+                <a16:creationId xmlns:a16="http://schemas.microsoft.com/office/drawing/2014/main" xmlns="" id="{350E87B3-4D53-5844-8D63-84DBE1A22125}"/>
               </a:ext>
             </a:extLst>
           </p:cNvPr>
@@ -290,7 +291,7 @@
           <p:cNvPr id="6" name="Slide Number Placeholder 5">
             <a:extLst>
               <a:ext uri="{FF2B5EF4-FFF2-40B4-BE49-F238E27FC236}">
-                <a16:creationId xmlns:a16="http://schemas.microsoft.com/office/drawing/2014/main" id="{4D4A7B11-56DD-3C40-87C5-C3D9D7647D3A}"/>
+                <a16:creationId xmlns:a16="http://schemas.microsoft.com/office/drawing/2014/main" xmlns="" id="{4D4A7B11-56DD-3C40-87C5-C3D9D7647D3A}"/>
               </a:ext>
             </a:extLst>
           </p:cNvPr>
@@ -349,7 +350,7 @@
           <p:cNvPr id="2" name="Title 1">
             <a:extLst>
               <a:ext uri="{FF2B5EF4-FFF2-40B4-BE49-F238E27FC236}">
-                <a16:creationId xmlns:a16="http://schemas.microsoft.com/office/drawing/2014/main" id="{9C4DAD51-548E-C346-AB94-FCBF0B95DF31}"/>
+                <a16:creationId xmlns:a16="http://schemas.microsoft.com/office/drawing/2014/main" xmlns="" id="{9C4DAD51-548E-C346-AB94-FCBF0B95DF31}"/>
               </a:ext>
             </a:extLst>
           </p:cNvPr>
@@ -377,7 +378,7 @@
           <p:cNvPr id="3" name="Vertical Text Placeholder 2">
             <a:extLst>
               <a:ext uri="{FF2B5EF4-FFF2-40B4-BE49-F238E27FC236}">
-                <a16:creationId xmlns:a16="http://schemas.microsoft.com/office/drawing/2014/main" id="{06DE8F93-C2B4-A648-85B2-0C6282B45EAF}"/>
+                <a16:creationId xmlns:a16="http://schemas.microsoft.com/office/drawing/2014/main" xmlns="" id="{06DE8F93-C2B4-A648-85B2-0C6282B45EAF}"/>
               </a:ext>
             </a:extLst>
           </p:cNvPr>
@@ -434,7 +435,7 @@
           <p:cNvPr id="4" name="Date Placeholder 3">
             <a:extLst>
               <a:ext uri="{FF2B5EF4-FFF2-40B4-BE49-F238E27FC236}">
-                <a16:creationId xmlns:a16="http://schemas.microsoft.com/office/drawing/2014/main" id="{6B42B610-2F41-1046-87D8-09D155072D21}"/>
+                <a16:creationId xmlns:a16="http://schemas.microsoft.com/office/drawing/2014/main" xmlns="" id="{6B42B610-2F41-1046-87D8-09D155072D21}"/>
               </a:ext>
             </a:extLst>
           </p:cNvPr>
@@ -452,7 +453,7 @@
           <a:p>
             <a:fld id="{69D69815-00FB-4E43-BAAC-A06AD43838EF}" type="datetimeFigureOut">
               <a:rPr lang="en-US" smtClean="0"/>
-              <a:t>3/25/18</a:t>
+              <a:t>30/3/18</a:t>
             </a:fld>
             <a:endParaRPr lang="en-US"/>
           </a:p>
@@ -463,7 +464,7 @@
           <p:cNvPr id="5" name="Footer Placeholder 4">
             <a:extLst>
               <a:ext uri="{FF2B5EF4-FFF2-40B4-BE49-F238E27FC236}">
-                <a16:creationId xmlns:a16="http://schemas.microsoft.com/office/drawing/2014/main" id="{E3C2F51F-B7E5-4E40-82D8-37C3B60553FB}"/>
+                <a16:creationId xmlns:a16="http://schemas.microsoft.com/office/drawing/2014/main" xmlns="" id="{E3C2F51F-B7E5-4E40-82D8-37C3B60553FB}"/>
               </a:ext>
             </a:extLst>
           </p:cNvPr>
@@ -488,7 +489,7 @@
           <p:cNvPr id="6" name="Slide Number Placeholder 5">
             <a:extLst>
               <a:ext uri="{FF2B5EF4-FFF2-40B4-BE49-F238E27FC236}">
-                <a16:creationId xmlns:a16="http://schemas.microsoft.com/office/drawing/2014/main" id="{DB11B958-42E7-1B4D-8C4F-E114459CA7C7}"/>
+                <a16:creationId xmlns:a16="http://schemas.microsoft.com/office/drawing/2014/main" xmlns="" id="{DB11B958-42E7-1B4D-8C4F-E114459CA7C7}"/>
               </a:ext>
             </a:extLst>
           </p:cNvPr>
@@ -547,7 +548,7 @@
           <p:cNvPr id="2" name="Vertical Title 1">
             <a:extLst>
               <a:ext uri="{FF2B5EF4-FFF2-40B4-BE49-F238E27FC236}">
-                <a16:creationId xmlns:a16="http://schemas.microsoft.com/office/drawing/2014/main" id="{359E0B49-277A-2F4F-914B-B4F79439599C}"/>
+                <a16:creationId xmlns:a16="http://schemas.microsoft.com/office/drawing/2014/main" xmlns="" id="{359E0B49-277A-2F4F-914B-B4F79439599C}"/>
               </a:ext>
             </a:extLst>
           </p:cNvPr>
@@ -580,7 +581,7 @@
           <p:cNvPr id="3" name="Vertical Text Placeholder 2">
             <a:extLst>
               <a:ext uri="{FF2B5EF4-FFF2-40B4-BE49-F238E27FC236}">
-                <a16:creationId xmlns:a16="http://schemas.microsoft.com/office/drawing/2014/main" id="{9F1CDD57-EC2D-874C-BABC-95CFA80DF343}"/>
+                <a16:creationId xmlns:a16="http://schemas.microsoft.com/office/drawing/2014/main" xmlns="" id="{9F1CDD57-EC2D-874C-BABC-95CFA80DF343}"/>
               </a:ext>
             </a:extLst>
           </p:cNvPr>
@@ -642,7 +643,7 @@
           <p:cNvPr id="4" name="Date Placeholder 3">
             <a:extLst>
               <a:ext uri="{FF2B5EF4-FFF2-40B4-BE49-F238E27FC236}">
-                <a16:creationId xmlns:a16="http://schemas.microsoft.com/office/drawing/2014/main" id="{8575EB51-9E23-8942-9C68-0D5A7F5196A9}"/>
+                <a16:creationId xmlns:a16="http://schemas.microsoft.com/office/drawing/2014/main" xmlns="" id="{8575EB51-9E23-8942-9C68-0D5A7F5196A9}"/>
               </a:ext>
             </a:extLst>
           </p:cNvPr>
@@ -660,7 +661,7 @@
           <a:p>
             <a:fld id="{69D69815-00FB-4E43-BAAC-A06AD43838EF}" type="datetimeFigureOut">
               <a:rPr lang="en-US" smtClean="0"/>
-              <a:t>3/25/18</a:t>
+              <a:t>30/3/18</a:t>
             </a:fld>
             <a:endParaRPr lang="en-US"/>
           </a:p>
@@ -671,7 +672,7 @@
           <p:cNvPr id="5" name="Footer Placeholder 4">
             <a:extLst>
               <a:ext uri="{FF2B5EF4-FFF2-40B4-BE49-F238E27FC236}">
-                <a16:creationId xmlns:a16="http://schemas.microsoft.com/office/drawing/2014/main" id="{5EE07E6D-6DAC-014C-90FF-F2CD477A4A76}"/>
+                <a16:creationId xmlns:a16="http://schemas.microsoft.com/office/drawing/2014/main" xmlns="" id="{5EE07E6D-6DAC-014C-90FF-F2CD477A4A76}"/>
               </a:ext>
             </a:extLst>
           </p:cNvPr>
@@ -696,7 +697,7 @@
           <p:cNvPr id="6" name="Slide Number Placeholder 5">
             <a:extLst>
               <a:ext uri="{FF2B5EF4-FFF2-40B4-BE49-F238E27FC236}">
-                <a16:creationId xmlns:a16="http://schemas.microsoft.com/office/drawing/2014/main" id="{F4BFE8DA-D428-E842-B1FC-1DE4A50BA10B}"/>
+                <a16:creationId xmlns:a16="http://schemas.microsoft.com/office/drawing/2014/main" xmlns="" id="{F4BFE8DA-D428-E842-B1FC-1DE4A50BA10B}"/>
               </a:ext>
             </a:extLst>
           </p:cNvPr>
@@ -755,7 +756,7 @@
           <p:cNvPr id="2" name="Title 1">
             <a:extLst>
               <a:ext uri="{FF2B5EF4-FFF2-40B4-BE49-F238E27FC236}">
-                <a16:creationId xmlns:a16="http://schemas.microsoft.com/office/drawing/2014/main" id="{3CB0282D-17D9-3E40-AA0F-9CF492C66FB6}"/>
+                <a16:creationId xmlns:a16="http://schemas.microsoft.com/office/drawing/2014/main" xmlns="" id="{3CB0282D-17D9-3E40-AA0F-9CF492C66FB6}"/>
               </a:ext>
             </a:extLst>
           </p:cNvPr>
@@ -783,7 +784,7 @@
           <p:cNvPr id="3" name="Content Placeholder 2">
             <a:extLst>
               <a:ext uri="{FF2B5EF4-FFF2-40B4-BE49-F238E27FC236}">
-                <a16:creationId xmlns:a16="http://schemas.microsoft.com/office/drawing/2014/main" id="{35220209-0206-E048-AF1C-B60B66B08B22}"/>
+                <a16:creationId xmlns:a16="http://schemas.microsoft.com/office/drawing/2014/main" xmlns="" id="{35220209-0206-E048-AF1C-B60B66B08B22}"/>
               </a:ext>
             </a:extLst>
           </p:cNvPr>
@@ -840,7 +841,7 @@
           <p:cNvPr id="4" name="Date Placeholder 3">
             <a:extLst>
               <a:ext uri="{FF2B5EF4-FFF2-40B4-BE49-F238E27FC236}">
-                <a16:creationId xmlns:a16="http://schemas.microsoft.com/office/drawing/2014/main" id="{5A2B238D-65B8-1348-BD42-ADEA723008B0}"/>
+                <a16:creationId xmlns:a16="http://schemas.microsoft.com/office/drawing/2014/main" xmlns="" id="{5A2B238D-65B8-1348-BD42-ADEA723008B0}"/>
               </a:ext>
             </a:extLst>
           </p:cNvPr>
@@ -858,7 +859,7 @@
           <a:p>
             <a:fld id="{69D69815-00FB-4E43-BAAC-A06AD43838EF}" type="datetimeFigureOut">
               <a:rPr lang="en-US" smtClean="0"/>
-              <a:t>3/25/18</a:t>
+              <a:t>30/3/18</a:t>
             </a:fld>
             <a:endParaRPr lang="en-US"/>
           </a:p>
@@ -869,7 +870,7 @@
           <p:cNvPr id="5" name="Footer Placeholder 4">
             <a:extLst>
               <a:ext uri="{FF2B5EF4-FFF2-40B4-BE49-F238E27FC236}">
-                <a16:creationId xmlns:a16="http://schemas.microsoft.com/office/drawing/2014/main" id="{38565CBF-5CF9-1144-B1D4-F15E65F8221E}"/>
+                <a16:creationId xmlns:a16="http://schemas.microsoft.com/office/drawing/2014/main" xmlns="" id="{38565CBF-5CF9-1144-B1D4-F15E65F8221E}"/>
               </a:ext>
             </a:extLst>
           </p:cNvPr>
@@ -894,7 +895,7 @@
           <p:cNvPr id="6" name="Slide Number Placeholder 5">
             <a:extLst>
               <a:ext uri="{FF2B5EF4-FFF2-40B4-BE49-F238E27FC236}">
-                <a16:creationId xmlns:a16="http://schemas.microsoft.com/office/drawing/2014/main" id="{2D53DA33-BC55-0743-8DD3-B26F5CDB1B84}"/>
+                <a16:creationId xmlns:a16="http://schemas.microsoft.com/office/drawing/2014/main" xmlns="" id="{2D53DA33-BC55-0743-8DD3-B26F5CDB1B84}"/>
               </a:ext>
             </a:extLst>
           </p:cNvPr>
@@ -953,7 +954,7 @@
           <p:cNvPr id="2" name="Title 1">
             <a:extLst>
               <a:ext uri="{FF2B5EF4-FFF2-40B4-BE49-F238E27FC236}">
-                <a16:creationId xmlns:a16="http://schemas.microsoft.com/office/drawing/2014/main" id="{59781170-57E9-7C42-A5F9-54B6C2558AA3}"/>
+                <a16:creationId xmlns:a16="http://schemas.microsoft.com/office/drawing/2014/main" xmlns="" id="{59781170-57E9-7C42-A5F9-54B6C2558AA3}"/>
               </a:ext>
             </a:extLst>
           </p:cNvPr>
@@ -990,7 +991,7 @@
           <p:cNvPr id="3" name="Text Placeholder 2">
             <a:extLst>
               <a:ext uri="{FF2B5EF4-FFF2-40B4-BE49-F238E27FC236}">
-                <a16:creationId xmlns:a16="http://schemas.microsoft.com/office/drawing/2014/main" id="{C76D47D1-9996-AC49-9AC8-49CC5993D2D9}"/>
+                <a16:creationId xmlns:a16="http://schemas.microsoft.com/office/drawing/2014/main" xmlns="" id="{C76D47D1-9996-AC49-9AC8-49CC5993D2D9}"/>
               </a:ext>
             </a:extLst>
           </p:cNvPr>
@@ -1115,7 +1116,7 @@
           <p:cNvPr id="4" name="Date Placeholder 3">
             <a:extLst>
               <a:ext uri="{FF2B5EF4-FFF2-40B4-BE49-F238E27FC236}">
-                <a16:creationId xmlns:a16="http://schemas.microsoft.com/office/drawing/2014/main" id="{2F9EA5B8-8027-A547-8395-3449DEC919AA}"/>
+                <a16:creationId xmlns:a16="http://schemas.microsoft.com/office/drawing/2014/main" xmlns="" id="{2F9EA5B8-8027-A547-8395-3449DEC919AA}"/>
               </a:ext>
             </a:extLst>
           </p:cNvPr>
@@ -1133,7 +1134,7 @@
           <a:p>
             <a:fld id="{69D69815-00FB-4E43-BAAC-A06AD43838EF}" type="datetimeFigureOut">
               <a:rPr lang="en-US" smtClean="0"/>
-              <a:t>3/25/18</a:t>
+              <a:t>30/3/18</a:t>
             </a:fld>
             <a:endParaRPr lang="en-US"/>
           </a:p>
@@ -1144,7 +1145,7 @@
           <p:cNvPr id="5" name="Footer Placeholder 4">
             <a:extLst>
               <a:ext uri="{FF2B5EF4-FFF2-40B4-BE49-F238E27FC236}">
-                <a16:creationId xmlns:a16="http://schemas.microsoft.com/office/drawing/2014/main" id="{1D73D18F-206D-3849-AEC7-BA59DD7C09EE}"/>
+                <a16:creationId xmlns:a16="http://schemas.microsoft.com/office/drawing/2014/main" xmlns="" id="{1D73D18F-206D-3849-AEC7-BA59DD7C09EE}"/>
               </a:ext>
             </a:extLst>
           </p:cNvPr>
@@ -1169,7 +1170,7 @@
           <p:cNvPr id="6" name="Slide Number Placeholder 5">
             <a:extLst>
               <a:ext uri="{FF2B5EF4-FFF2-40B4-BE49-F238E27FC236}">
-                <a16:creationId xmlns:a16="http://schemas.microsoft.com/office/drawing/2014/main" id="{D9E562DA-7766-B64D-849C-2D200163D0CA}"/>
+                <a16:creationId xmlns:a16="http://schemas.microsoft.com/office/drawing/2014/main" xmlns="" id="{D9E562DA-7766-B64D-849C-2D200163D0CA}"/>
               </a:ext>
             </a:extLst>
           </p:cNvPr>
@@ -1228,7 +1229,7 @@
           <p:cNvPr id="2" name="Title 1">
             <a:extLst>
               <a:ext uri="{FF2B5EF4-FFF2-40B4-BE49-F238E27FC236}">
-                <a16:creationId xmlns:a16="http://schemas.microsoft.com/office/drawing/2014/main" id="{F66624AE-C7C9-6F41-9DDD-E5AFBD0316F4}"/>
+                <a16:creationId xmlns:a16="http://schemas.microsoft.com/office/drawing/2014/main" xmlns="" id="{F66624AE-C7C9-6F41-9DDD-E5AFBD0316F4}"/>
               </a:ext>
             </a:extLst>
           </p:cNvPr>
@@ -1256,7 +1257,7 @@
           <p:cNvPr id="3" name="Content Placeholder 2">
             <a:extLst>
               <a:ext uri="{FF2B5EF4-FFF2-40B4-BE49-F238E27FC236}">
-                <a16:creationId xmlns:a16="http://schemas.microsoft.com/office/drawing/2014/main" id="{17C139A5-EF3D-D144-96C8-FAAFC5A0E160}"/>
+                <a16:creationId xmlns:a16="http://schemas.microsoft.com/office/drawing/2014/main" xmlns="" id="{17C139A5-EF3D-D144-96C8-FAAFC5A0E160}"/>
               </a:ext>
             </a:extLst>
           </p:cNvPr>
@@ -1318,7 +1319,7 @@
           <p:cNvPr id="4" name="Content Placeholder 3">
             <a:extLst>
               <a:ext uri="{FF2B5EF4-FFF2-40B4-BE49-F238E27FC236}">
-                <a16:creationId xmlns:a16="http://schemas.microsoft.com/office/drawing/2014/main" id="{37A6E2F0-D0CF-CB46-9D3D-1F5089169DCF}"/>
+                <a16:creationId xmlns:a16="http://schemas.microsoft.com/office/drawing/2014/main" xmlns="" id="{37A6E2F0-D0CF-CB46-9D3D-1F5089169DCF}"/>
               </a:ext>
             </a:extLst>
           </p:cNvPr>
@@ -1380,7 +1381,7 @@
           <p:cNvPr id="5" name="Date Placeholder 4">
             <a:extLst>
               <a:ext uri="{FF2B5EF4-FFF2-40B4-BE49-F238E27FC236}">
-                <a16:creationId xmlns:a16="http://schemas.microsoft.com/office/drawing/2014/main" id="{198854F3-A525-9347-B280-11FE7B0B32DD}"/>
+                <a16:creationId xmlns:a16="http://schemas.microsoft.com/office/drawing/2014/main" xmlns="" id="{198854F3-A525-9347-B280-11FE7B0B32DD}"/>
               </a:ext>
             </a:extLst>
           </p:cNvPr>
@@ -1398,7 +1399,7 @@
           <a:p>
             <a:fld id="{69D69815-00FB-4E43-BAAC-A06AD43838EF}" type="datetimeFigureOut">
               <a:rPr lang="en-US" smtClean="0"/>
-              <a:t>3/25/18</a:t>
+              <a:t>30/3/18</a:t>
             </a:fld>
             <a:endParaRPr lang="en-US"/>
           </a:p>
@@ -1409,7 +1410,7 @@
           <p:cNvPr id="6" name="Footer Placeholder 5">
             <a:extLst>
               <a:ext uri="{FF2B5EF4-FFF2-40B4-BE49-F238E27FC236}">
-                <a16:creationId xmlns:a16="http://schemas.microsoft.com/office/drawing/2014/main" id="{F50039E6-EDA7-D343-800B-38F468B83364}"/>
+                <a16:creationId xmlns:a16="http://schemas.microsoft.com/office/drawing/2014/main" xmlns="" id="{F50039E6-EDA7-D343-800B-38F468B83364}"/>
               </a:ext>
             </a:extLst>
           </p:cNvPr>
@@ -1434,7 +1435,7 @@
           <p:cNvPr id="7" name="Slide Number Placeholder 6">
             <a:extLst>
               <a:ext uri="{FF2B5EF4-FFF2-40B4-BE49-F238E27FC236}">
-                <a16:creationId xmlns:a16="http://schemas.microsoft.com/office/drawing/2014/main" id="{F1EF24E3-6AF8-5042-8577-BEE1E8EEF7C1}"/>
+                <a16:creationId xmlns:a16="http://schemas.microsoft.com/office/drawing/2014/main" xmlns="" id="{F1EF24E3-6AF8-5042-8577-BEE1E8EEF7C1}"/>
               </a:ext>
             </a:extLst>
           </p:cNvPr>
@@ -1493,7 +1494,7 @@
           <p:cNvPr id="2" name="Title 1">
             <a:extLst>
               <a:ext uri="{FF2B5EF4-FFF2-40B4-BE49-F238E27FC236}">
-                <a16:creationId xmlns:a16="http://schemas.microsoft.com/office/drawing/2014/main" id="{0037A71B-2EDD-424D-BA43-8FAC6DBC4AFE}"/>
+                <a16:creationId xmlns:a16="http://schemas.microsoft.com/office/drawing/2014/main" xmlns="" id="{0037A71B-2EDD-424D-BA43-8FAC6DBC4AFE}"/>
               </a:ext>
             </a:extLst>
           </p:cNvPr>
@@ -1526,7 +1527,7 @@
           <p:cNvPr id="3" name="Text Placeholder 2">
             <a:extLst>
               <a:ext uri="{FF2B5EF4-FFF2-40B4-BE49-F238E27FC236}">
-                <a16:creationId xmlns:a16="http://schemas.microsoft.com/office/drawing/2014/main" id="{A8EBD004-A275-1A43-80C1-FDBDB96285FF}"/>
+                <a16:creationId xmlns:a16="http://schemas.microsoft.com/office/drawing/2014/main" xmlns="" id="{A8EBD004-A275-1A43-80C1-FDBDB96285FF}"/>
               </a:ext>
             </a:extLst>
           </p:cNvPr>
@@ -1597,7 +1598,7 @@
           <p:cNvPr id="4" name="Content Placeholder 3">
             <a:extLst>
               <a:ext uri="{FF2B5EF4-FFF2-40B4-BE49-F238E27FC236}">
-                <a16:creationId xmlns:a16="http://schemas.microsoft.com/office/drawing/2014/main" id="{02914BFC-EA01-C94E-8E86-E7B48CA36088}"/>
+                <a16:creationId xmlns:a16="http://schemas.microsoft.com/office/drawing/2014/main" xmlns="" id="{02914BFC-EA01-C94E-8E86-E7B48CA36088}"/>
               </a:ext>
             </a:extLst>
           </p:cNvPr>
@@ -1659,7 +1660,7 @@
           <p:cNvPr id="5" name="Text Placeholder 4">
             <a:extLst>
               <a:ext uri="{FF2B5EF4-FFF2-40B4-BE49-F238E27FC236}">
-                <a16:creationId xmlns:a16="http://schemas.microsoft.com/office/drawing/2014/main" id="{CA2DA1D8-C452-A246-AF81-5CCB4F867EE9}"/>
+                <a16:creationId xmlns:a16="http://schemas.microsoft.com/office/drawing/2014/main" xmlns="" id="{CA2DA1D8-C452-A246-AF81-5CCB4F867EE9}"/>
               </a:ext>
             </a:extLst>
           </p:cNvPr>
@@ -1730,7 +1731,7 @@
           <p:cNvPr id="6" name="Content Placeholder 5">
             <a:extLst>
               <a:ext uri="{FF2B5EF4-FFF2-40B4-BE49-F238E27FC236}">
-                <a16:creationId xmlns:a16="http://schemas.microsoft.com/office/drawing/2014/main" id="{CCF5491E-7472-B84F-A1AF-A8ACC988A4D5}"/>
+                <a16:creationId xmlns:a16="http://schemas.microsoft.com/office/drawing/2014/main" xmlns="" id="{CCF5491E-7472-B84F-A1AF-A8ACC988A4D5}"/>
               </a:ext>
             </a:extLst>
           </p:cNvPr>
@@ -1792,7 +1793,7 @@
           <p:cNvPr id="7" name="Date Placeholder 6">
             <a:extLst>
               <a:ext uri="{FF2B5EF4-FFF2-40B4-BE49-F238E27FC236}">
-                <a16:creationId xmlns:a16="http://schemas.microsoft.com/office/drawing/2014/main" id="{1D0D4B8D-0D2E-484C-9FBF-0BD527673A9B}"/>
+                <a16:creationId xmlns:a16="http://schemas.microsoft.com/office/drawing/2014/main" xmlns="" id="{1D0D4B8D-0D2E-484C-9FBF-0BD527673A9B}"/>
               </a:ext>
             </a:extLst>
           </p:cNvPr>
@@ -1810,7 +1811,7 @@
           <a:p>
             <a:fld id="{69D69815-00FB-4E43-BAAC-A06AD43838EF}" type="datetimeFigureOut">
               <a:rPr lang="en-US" smtClean="0"/>
-              <a:t>3/25/18</a:t>
+              <a:t>30/3/18</a:t>
             </a:fld>
             <a:endParaRPr lang="en-US"/>
           </a:p>
@@ -1821,7 +1822,7 @@
           <p:cNvPr id="8" name="Footer Placeholder 7">
             <a:extLst>
               <a:ext uri="{FF2B5EF4-FFF2-40B4-BE49-F238E27FC236}">
-                <a16:creationId xmlns:a16="http://schemas.microsoft.com/office/drawing/2014/main" id="{7BDBD72A-2FE0-6E4F-87E0-B36B034CF9E7}"/>
+                <a16:creationId xmlns:a16="http://schemas.microsoft.com/office/drawing/2014/main" xmlns="" id="{7BDBD72A-2FE0-6E4F-87E0-B36B034CF9E7}"/>
               </a:ext>
             </a:extLst>
           </p:cNvPr>
@@ -1846,7 +1847,7 @@
           <p:cNvPr id="9" name="Slide Number Placeholder 8">
             <a:extLst>
               <a:ext uri="{FF2B5EF4-FFF2-40B4-BE49-F238E27FC236}">
-                <a16:creationId xmlns:a16="http://schemas.microsoft.com/office/drawing/2014/main" id="{8B4FB430-0E38-FC43-A35E-23A9DA7E1455}"/>
+                <a16:creationId xmlns:a16="http://schemas.microsoft.com/office/drawing/2014/main" xmlns="" id="{8B4FB430-0E38-FC43-A35E-23A9DA7E1455}"/>
               </a:ext>
             </a:extLst>
           </p:cNvPr>
@@ -1905,7 +1906,7 @@
           <p:cNvPr id="2" name="Title 1">
             <a:extLst>
               <a:ext uri="{FF2B5EF4-FFF2-40B4-BE49-F238E27FC236}">
-                <a16:creationId xmlns:a16="http://schemas.microsoft.com/office/drawing/2014/main" id="{772664A5-A283-7A46-873A-547684F2FEA6}"/>
+                <a16:creationId xmlns:a16="http://schemas.microsoft.com/office/drawing/2014/main" xmlns="" id="{772664A5-A283-7A46-873A-547684F2FEA6}"/>
               </a:ext>
             </a:extLst>
           </p:cNvPr>
@@ -1933,7 +1934,7 @@
           <p:cNvPr id="3" name="Date Placeholder 2">
             <a:extLst>
               <a:ext uri="{FF2B5EF4-FFF2-40B4-BE49-F238E27FC236}">
-                <a16:creationId xmlns:a16="http://schemas.microsoft.com/office/drawing/2014/main" id="{02FCF943-A93D-B248-8BBC-955713E71A86}"/>
+                <a16:creationId xmlns:a16="http://schemas.microsoft.com/office/drawing/2014/main" xmlns="" id="{02FCF943-A93D-B248-8BBC-955713E71A86}"/>
               </a:ext>
             </a:extLst>
           </p:cNvPr>
@@ -1951,7 +1952,7 @@
           <a:p>
             <a:fld id="{69D69815-00FB-4E43-BAAC-A06AD43838EF}" type="datetimeFigureOut">
               <a:rPr lang="en-US" smtClean="0"/>
-              <a:t>3/25/18</a:t>
+              <a:t>30/3/18</a:t>
             </a:fld>
             <a:endParaRPr lang="en-US"/>
           </a:p>
@@ -1962,7 +1963,7 @@
           <p:cNvPr id="4" name="Footer Placeholder 3">
             <a:extLst>
               <a:ext uri="{FF2B5EF4-FFF2-40B4-BE49-F238E27FC236}">
-                <a16:creationId xmlns:a16="http://schemas.microsoft.com/office/drawing/2014/main" id="{4636C30A-0D4C-F942-8E4C-EDD81F43762D}"/>
+                <a16:creationId xmlns:a16="http://schemas.microsoft.com/office/drawing/2014/main" xmlns="" id="{4636C30A-0D4C-F942-8E4C-EDD81F43762D}"/>
               </a:ext>
             </a:extLst>
           </p:cNvPr>
@@ -1987,7 +1988,7 @@
           <p:cNvPr id="5" name="Slide Number Placeholder 4">
             <a:extLst>
               <a:ext uri="{FF2B5EF4-FFF2-40B4-BE49-F238E27FC236}">
-                <a16:creationId xmlns:a16="http://schemas.microsoft.com/office/drawing/2014/main" id="{687C1859-152C-0747-9F1F-9CE1D103AAB4}"/>
+                <a16:creationId xmlns:a16="http://schemas.microsoft.com/office/drawing/2014/main" xmlns="" id="{687C1859-152C-0747-9F1F-9CE1D103AAB4}"/>
               </a:ext>
             </a:extLst>
           </p:cNvPr>
@@ -2046,7 +2047,7 @@
           <p:cNvPr id="2" name="Date Placeholder 1">
             <a:extLst>
               <a:ext uri="{FF2B5EF4-FFF2-40B4-BE49-F238E27FC236}">
-                <a16:creationId xmlns:a16="http://schemas.microsoft.com/office/drawing/2014/main" id="{221F10F7-BBAD-2440-90BF-4D78B9AE4797}"/>
+                <a16:creationId xmlns:a16="http://schemas.microsoft.com/office/drawing/2014/main" xmlns="" id="{221F10F7-BBAD-2440-90BF-4D78B9AE4797}"/>
               </a:ext>
             </a:extLst>
           </p:cNvPr>
@@ -2064,7 +2065,7 @@
           <a:p>
             <a:fld id="{69D69815-00FB-4E43-BAAC-A06AD43838EF}" type="datetimeFigureOut">
               <a:rPr lang="en-US" smtClean="0"/>
-              <a:t>3/25/18</a:t>
+              <a:t>30/3/18</a:t>
             </a:fld>
             <a:endParaRPr lang="en-US"/>
           </a:p>
@@ -2075,7 +2076,7 @@
           <p:cNvPr id="3" name="Footer Placeholder 2">
             <a:extLst>
               <a:ext uri="{FF2B5EF4-FFF2-40B4-BE49-F238E27FC236}">
-                <a16:creationId xmlns:a16="http://schemas.microsoft.com/office/drawing/2014/main" id="{970BA187-7417-0149-9807-E23D196943F0}"/>
+                <a16:creationId xmlns:a16="http://schemas.microsoft.com/office/drawing/2014/main" xmlns="" id="{970BA187-7417-0149-9807-E23D196943F0}"/>
               </a:ext>
             </a:extLst>
           </p:cNvPr>
@@ -2100,7 +2101,7 @@
           <p:cNvPr id="4" name="Slide Number Placeholder 3">
             <a:extLst>
               <a:ext uri="{FF2B5EF4-FFF2-40B4-BE49-F238E27FC236}">
-                <a16:creationId xmlns:a16="http://schemas.microsoft.com/office/drawing/2014/main" id="{972BA273-EF81-CF47-8EEB-3D44C584EAE2}"/>
+                <a16:creationId xmlns:a16="http://schemas.microsoft.com/office/drawing/2014/main" xmlns="" id="{972BA273-EF81-CF47-8EEB-3D44C584EAE2}"/>
               </a:ext>
             </a:extLst>
           </p:cNvPr>
@@ -2159,7 +2160,7 @@
           <p:cNvPr id="2" name="Title 1">
             <a:extLst>
               <a:ext uri="{FF2B5EF4-FFF2-40B4-BE49-F238E27FC236}">
-                <a16:creationId xmlns:a16="http://schemas.microsoft.com/office/drawing/2014/main" id="{B328FB70-83E6-0741-A0FD-5E7FF143F6DF}"/>
+                <a16:creationId xmlns:a16="http://schemas.microsoft.com/office/drawing/2014/main" xmlns="" id="{B328FB70-83E6-0741-A0FD-5E7FF143F6DF}"/>
               </a:ext>
             </a:extLst>
           </p:cNvPr>
@@ -2196,7 +2197,7 @@
           <p:cNvPr id="3" name="Content Placeholder 2">
             <a:extLst>
               <a:ext uri="{FF2B5EF4-FFF2-40B4-BE49-F238E27FC236}">
-                <a16:creationId xmlns:a16="http://schemas.microsoft.com/office/drawing/2014/main" id="{B5FA8710-E351-9446-9098-659B3ABAD182}"/>
+                <a16:creationId xmlns:a16="http://schemas.microsoft.com/office/drawing/2014/main" xmlns="" id="{B5FA8710-E351-9446-9098-659B3ABAD182}"/>
               </a:ext>
             </a:extLst>
           </p:cNvPr>
@@ -2286,7 +2287,7 @@
           <p:cNvPr id="4" name="Text Placeholder 3">
             <a:extLst>
               <a:ext uri="{FF2B5EF4-FFF2-40B4-BE49-F238E27FC236}">
-                <a16:creationId xmlns:a16="http://schemas.microsoft.com/office/drawing/2014/main" id="{01A833E2-DD99-D24F-A7E3-1D43B9875D7B}"/>
+                <a16:creationId xmlns:a16="http://schemas.microsoft.com/office/drawing/2014/main" xmlns="" id="{01A833E2-DD99-D24F-A7E3-1D43B9875D7B}"/>
               </a:ext>
             </a:extLst>
           </p:cNvPr>
@@ -2357,7 +2358,7 @@
           <p:cNvPr id="5" name="Date Placeholder 4">
             <a:extLst>
               <a:ext uri="{FF2B5EF4-FFF2-40B4-BE49-F238E27FC236}">
-                <a16:creationId xmlns:a16="http://schemas.microsoft.com/office/drawing/2014/main" id="{245EB7B9-9C80-C24F-AFE8-DB492150466E}"/>
+                <a16:creationId xmlns:a16="http://schemas.microsoft.com/office/drawing/2014/main" xmlns="" id="{245EB7B9-9C80-C24F-AFE8-DB492150466E}"/>
               </a:ext>
             </a:extLst>
           </p:cNvPr>
@@ -2375,7 +2376,7 @@
           <a:p>
             <a:fld id="{69D69815-00FB-4E43-BAAC-A06AD43838EF}" type="datetimeFigureOut">
               <a:rPr lang="en-US" smtClean="0"/>
-              <a:t>3/25/18</a:t>
+              <a:t>30/3/18</a:t>
             </a:fld>
             <a:endParaRPr lang="en-US"/>
           </a:p>
@@ -2386,7 +2387,7 @@
           <p:cNvPr id="6" name="Footer Placeholder 5">
             <a:extLst>
               <a:ext uri="{FF2B5EF4-FFF2-40B4-BE49-F238E27FC236}">
-                <a16:creationId xmlns:a16="http://schemas.microsoft.com/office/drawing/2014/main" id="{A8978673-B020-3342-8531-AA0B462C3D22}"/>
+                <a16:creationId xmlns:a16="http://schemas.microsoft.com/office/drawing/2014/main" xmlns="" id="{A8978673-B020-3342-8531-AA0B462C3D22}"/>
               </a:ext>
             </a:extLst>
           </p:cNvPr>
@@ -2411,7 +2412,7 @@
           <p:cNvPr id="7" name="Slide Number Placeholder 6">
             <a:extLst>
               <a:ext uri="{FF2B5EF4-FFF2-40B4-BE49-F238E27FC236}">
-                <a16:creationId xmlns:a16="http://schemas.microsoft.com/office/drawing/2014/main" id="{752090D5-4213-6240-93FB-F23E46F257FE}"/>
+                <a16:creationId xmlns:a16="http://schemas.microsoft.com/office/drawing/2014/main" xmlns="" id="{752090D5-4213-6240-93FB-F23E46F257FE}"/>
               </a:ext>
             </a:extLst>
           </p:cNvPr>
@@ -2470,7 +2471,7 @@
           <p:cNvPr id="2" name="Title 1">
             <a:extLst>
               <a:ext uri="{FF2B5EF4-FFF2-40B4-BE49-F238E27FC236}">
-                <a16:creationId xmlns:a16="http://schemas.microsoft.com/office/drawing/2014/main" id="{A76370CD-5D35-DB46-97DD-3F50DF118189}"/>
+                <a16:creationId xmlns:a16="http://schemas.microsoft.com/office/drawing/2014/main" xmlns="" id="{A76370CD-5D35-DB46-97DD-3F50DF118189}"/>
               </a:ext>
             </a:extLst>
           </p:cNvPr>
@@ -2507,7 +2508,7 @@
           <p:cNvPr id="3" name="Picture Placeholder 2">
             <a:extLst>
               <a:ext uri="{FF2B5EF4-FFF2-40B4-BE49-F238E27FC236}">
-                <a16:creationId xmlns:a16="http://schemas.microsoft.com/office/drawing/2014/main" id="{FFD325A3-4FB2-F443-9592-7F98D9B44D05}"/>
+                <a16:creationId xmlns:a16="http://schemas.microsoft.com/office/drawing/2014/main" xmlns="" id="{FFD325A3-4FB2-F443-9592-7F98D9B44D05}"/>
               </a:ext>
             </a:extLst>
           </p:cNvPr>
@@ -2574,7 +2575,7 @@
           <p:cNvPr id="4" name="Text Placeholder 3">
             <a:extLst>
               <a:ext uri="{FF2B5EF4-FFF2-40B4-BE49-F238E27FC236}">
-                <a16:creationId xmlns:a16="http://schemas.microsoft.com/office/drawing/2014/main" id="{44462BE4-546A-A143-8188-C19F64F7755C}"/>
+                <a16:creationId xmlns:a16="http://schemas.microsoft.com/office/drawing/2014/main" xmlns="" id="{44462BE4-546A-A143-8188-C19F64F7755C}"/>
               </a:ext>
             </a:extLst>
           </p:cNvPr>
@@ -2645,7 +2646,7 @@
           <p:cNvPr id="5" name="Date Placeholder 4">
             <a:extLst>
               <a:ext uri="{FF2B5EF4-FFF2-40B4-BE49-F238E27FC236}">
-                <a16:creationId xmlns:a16="http://schemas.microsoft.com/office/drawing/2014/main" id="{7A3D15A5-9EA7-B248-B290-49F4A5AB9AC6}"/>
+                <a16:creationId xmlns:a16="http://schemas.microsoft.com/office/drawing/2014/main" xmlns="" id="{7A3D15A5-9EA7-B248-B290-49F4A5AB9AC6}"/>
               </a:ext>
             </a:extLst>
           </p:cNvPr>
@@ -2663,7 +2664,7 @@
           <a:p>
             <a:fld id="{69D69815-00FB-4E43-BAAC-A06AD43838EF}" type="datetimeFigureOut">
               <a:rPr lang="en-US" smtClean="0"/>
-              <a:t>3/25/18</a:t>
+              <a:t>30/3/18</a:t>
             </a:fld>
             <a:endParaRPr lang="en-US"/>
           </a:p>
@@ -2674,7 +2675,7 @@
           <p:cNvPr id="6" name="Footer Placeholder 5">
             <a:extLst>
               <a:ext uri="{FF2B5EF4-FFF2-40B4-BE49-F238E27FC236}">
-                <a16:creationId xmlns:a16="http://schemas.microsoft.com/office/drawing/2014/main" id="{EDDED618-00BC-214C-A137-E10A446896C7}"/>
+                <a16:creationId xmlns:a16="http://schemas.microsoft.com/office/drawing/2014/main" xmlns="" id="{EDDED618-00BC-214C-A137-E10A446896C7}"/>
               </a:ext>
             </a:extLst>
           </p:cNvPr>
@@ -2699,7 +2700,7 @@
           <p:cNvPr id="7" name="Slide Number Placeholder 6">
             <a:extLst>
               <a:ext uri="{FF2B5EF4-FFF2-40B4-BE49-F238E27FC236}">
-                <a16:creationId xmlns:a16="http://schemas.microsoft.com/office/drawing/2014/main" id="{9A8A840C-D164-5D4E-97F9-DA009776BFA6}"/>
+                <a16:creationId xmlns:a16="http://schemas.microsoft.com/office/drawing/2014/main" xmlns="" id="{9A8A840C-D164-5D4E-97F9-DA009776BFA6}"/>
               </a:ext>
             </a:extLst>
           </p:cNvPr>
@@ -2763,7 +2764,7 @@
           <p:cNvPr id="2" name="Title Placeholder 1">
             <a:extLst>
               <a:ext uri="{FF2B5EF4-FFF2-40B4-BE49-F238E27FC236}">
-                <a16:creationId xmlns:a16="http://schemas.microsoft.com/office/drawing/2014/main" id="{9D3AF8EE-A921-F941-B4F5-9C1E2FF27B7C}"/>
+                <a16:creationId xmlns:a16="http://schemas.microsoft.com/office/drawing/2014/main" xmlns="" id="{9D3AF8EE-A921-F941-B4F5-9C1E2FF27B7C}"/>
               </a:ext>
             </a:extLst>
           </p:cNvPr>
@@ -2801,7 +2802,7 @@
           <p:cNvPr id="3" name="Text Placeholder 2">
             <a:extLst>
               <a:ext uri="{FF2B5EF4-FFF2-40B4-BE49-F238E27FC236}">
-                <a16:creationId xmlns:a16="http://schemas.microsoft.com/office/drawing/2014/main" id="{A4BF8956-2C04-3C48-9371-A084B6FC9B5F}"/>
+                <a16:creationId xmlns:a16="http://schemas.microsoft.com/office/drawing/2014/main" xmlns="" id="{A4BF8956-2C04-3C48-9371-A084B6FC9B5F}"/>
               </a:ext>
             </a:extLst>
           </p:cNvPr>
@@ -2868,7 +2869,7 @@
           <p:cNvPr id="4" name="Date Placeholder 3">
             <a:extLst>
               <a:ext uri="{FF2B5EF4-FFF2-40B4-BE49-F238E27FC236}">
-                <a16:creationId xmlns:a16="http://schemas.microsoft.com/office/drawing/2014/main" id="{F3534768-3222-504E-81D5-E8CE2B2E6B43}"/>
+                <a16:creationId xmlns:a16="http://schemas.microsoft.com/office/drawing/2014/main" xmlns="" id="{F3534768-3222-504E-81D5-E8CE2B2E6B43}"/>
               </a:ext>
             </a:extLst>
           </p:cNvPr>
@@ -2904,7 +2905,7 @@
           <a:p>
             <a:fld id="{69D69815-00FB-4E43-BAAC-A06AD43838EF}" type="datetimeFigureOut">
               <a:rPr lang="en-US" smtClean="0"/>
-              <a:t>3/25/18</a:t>
+              <a:t>30/3/18</a:t>
             </a:fld>
             <a:endParaRPr lang="en-US"/>
           </a:p>
@@ -2915,7 +2916,7 @@
           <p:cNvPr id="5" name="Footer Placeholder 4">
             <a:extLst>
               <a:ext uri="{FF2B5EF4-FFF2-40B4-BE49-F238E27FC236}">
-                <a16:creationId xmlns:a16="http://schemas.microsoft.com/office/drawing/2014/main" id="{6A6C96B1-1625-9241-A11C-F4959CD19836}"/>
+                <a16:creationId xmlns:a16="http://schemas.microsoft.com/office/drawing/2014/main" xmlns="" id="{6A6C96B1-1625-9241-A11C-F4959CD19836}"/>
               </a:ext>
             </a:extLst>
           </p:cNvPr>
@@ -2958,7 +2959,7 @@
           <p:cNvPr id="6" name="Slide Number Placeholder 5">
             <a:extLst>
               <a:ext uri="{FF2B5EF4-FFF2-40B4-BE49-F238E27FC236}">
-                <a16:creationId xmlns:a16="http://schemas.microsoft.com/office/drawing/2014/main" id="{1417091F-509D-C446-A673-C5C58D9ADFF1}"/>
+                <a16:creationId xmlns:a16="http://schemas.microsoft.com/office/drawing/2014/main" xmlns="" id="{1417091F-509D-C446-A673-C5C58D9ADFF1}"/>
               </a:ext>
             </a:extLst>
           </p:cNvPr>
@@ -3326,7 +3327,7 @@
           <p:cNvPr id="5" name="Picture 4">
             <a:extLst>
               <a:ext uri="{FF2B5EF4-FFF2-40B4-BE49-F238E27FC236}">
-                <a16:creationId xmlns:a16="http://schemas.microsoft.com/office/drawing/2014/main" id="{02F0B0AD-715C-B042-9454-3D9D5C7C7B36}"/>
+                <a16:creationId xmlns:a16="http://schemas.microsoft.com/office/drawing/2014/main" xmlns="" id="{02F0B0AD-715C-B042-9454-3D9D5C7C7B36}"/>
               </a:ext>
             </a:extLst>
           </p:cNvPr>
@@ -3356,7 +3357,7 @@
           <p:cNvPr id="6" name="Picture 5">
             <a:extLst>
               <a:ext uri="{FF2B5EF4-FFF2-40B4-BE49-F238E27FC236}">
-                <a16:creationId xmlns:a16="http://schemas.microsoft.com/office/drawing/2014/main" id="{C107D972-7F20-8243-B009-065694479AD9}"/>
+                <a16:creationId xmlns:a16="http://schemas.microsoft.com/office/drawing/2014/main" xmlns="" id="{C107D972-7F20-8243-B009-065694479AD9}"/>
               </a:ext>
             </a:extLst>
           </p:cNvPr>
@@ -3386,7 +3387,7 @@
           <p:cNvPr id="7" name="Picture 6">
             <a:extLst>
               <a:ext uri="{FF2B5EF4-FFF2-40B4-BE49-F238E27FC236}">
-                <a16:creationId xmlns:a16="http://schemas.microsoft.com/office/drawing/2014/main" id="{7881BEE9-A0C7-4642-AA04-A64DAB478EB7}"/>
+                <a16:creationId xmlns:a16="http://schemas.microsoft.com/office/drawing/2014/main" xmlns="" id="{7881BEE9-A0C7-4642-AA04-A64DAB478EB7}"/>
               </a:ext>
             </a:extLst>
           </p:cNvPr>
@@ -3416,7 +3417,7 @@
           <p:cNvPr id="8" name="Picture 7">
             <a:extLst>
               <a:ext uri="{FF2B5EF4-FFF2-40B4-BE49-F238E27FC236}">
-                <a16:creationId xmlns:a16="http://schemas.microsoft.com/office/drawing/2014/main" id="{73ABE633-7649-1C43-A2D7-75DC8611D970}"/>
+                <a16:creationId xmlns:a16="http://schemas.microsoft.com/office/drawing/2014/main" xmlns="" id="{73ABE633-7649-1C43-A2D7-75DC8611D970}"/>
               </a:ext>
             </a:extLst>
           </p:cNvPr>
@@ -3446,7 +3447,7 @@
           <p:cNvPr id="9" name="TextBox 8">
             <a:extLst>
               <a:ext uri="{FF2B5EF4-FFF2-40B4-BE49-F238E27FC236}">
-                <a16:creationId xmlns:a16="http://schemas.microsoft.com/office/drawing/2014/main" id="{6D1E8139-A455-0041-B92D-D55B3E0E9B13}"/>
+                <a16:creationId xmlns:a16="http://schemas.microsoft.com/office/drawing/2014/main" xmlns="" id="{6D1E8139-A455-0041-B92D-D55B3E0E9B13}"/>
               </a:ext>
             </a:extLst>
           </p:cNvPr>
@@ -3487,7 +3488,7 @@
           <p:cNvPr id="11" name="Straight Arrow Connector 10">
             <a:extLst>
               <a:ext uri="{FF2B5EF4-FFF2-40B4-BE49-F238E27FC236}">
-                <a16:creationId xmlns:a16="http://schemas.microsoft.com/office/drawing/2014/main" id="{1FAE8E44-278F-8247-99D8-D86E49D69730}"/>
+                <a16:creationId xmlns:a16="http://schemas.microsoft.com/office/drawing/2014/main" xmlns="" id="{1FAE8E44-278F-8247-99D8-D86E49D69730}"/>
               </a:ext>
             </a:extLst>
           </p:cNvPr>
@@ -3529,7 +3530,7 @@
           <p:cNvPr id="12" name="Rounded Rectangle 11">
             <a:extLst>
               <a:ext uri="{FF2B5EF4-FFF2-40B4-BE49-F238E27FC236}">
-                <a16:creationId xmlns:a16="http://schemas.microsoft.com/office/drawing/2014/main" id="{125FD2C6-24F4-C449-BC34-1C844B852019}"/>
+                <a16:creationId xmlns:a16="http://schemas.microsoft.com/office/drawing/2014/main" xmlns="" id="{125FD2C6-24F4-C449-BC34-1C844B852019}"/>
               </a:ext>
             </a:extLst>
           </p:cNvPr>
@@ -3581,7 +3582,7 @@
           <p:cNvPr id="13" name="TextBox 12">
             <a:extLst>
               <a:ext uri="{FF2B5EF4-FFF2-40B4-BE49-F238E27FC236}">
-                <a16:creationId xmlns:a16="http://schemas.microsoft.com/office/drawing/2014/main" id="{A52AC69C-48B9-4541-8133-98FEAE61C97F}"/>
+                <a16:creationId xmlns:a16="http://schemas.microsoft.com/office/drawing/2014/main" xmlns="" id="{A52AC69C-48B9-4541-8133-98FEAE61C97F}"/>
               </a:ext>
             </a:extLst>
           </p:cNvPr>
@@ -3622,7 +3623,7 @@
           <p:cNvPr id="15" name="TextBox 14">
             <a:extLst>
               <a:ext uri="{FF2B5EF4-FFF2-40B4-BE49-F238E27FC236}">
-                <a16:creationId xmlns:a16="http://schemas.microsoft.com/office/drawing/2014/main" id="{EC956890-B07A-9D45-94CF-6C4C92BCE8CC}"/>
+                <a16:creationId xmlns:a16="http://schemas.microsoft.com/office/drawing/2014/main" xmlns="" id="{EC956890-B07A-9D45-94CF-6C4C92BCE8CC}"/>
               </a:ext>
             </a:extLst>
           </p:cNvPr>
@@ -3632,7 +3633,7 @@
         <p:spPr>
           <a:xfrm>
             <a:off x="5526031" y="5914029"/>
-            <a:ext cx="3273539" cy="261610"/>
+            <a:ext cx="3487377" cy="261610"/>
           </a:xfrm>
           <a:prstGeom prst="rect">
             <a:avLst/>
@@ -3662,6 +3663,233 @@
     <p:extLst>
       <p:ext uri="{BB962C8B-B14F-4D97-AF65-F5344CB8AC3E}">
         <p14:creationId xmlns:p14="http://schemas.microsoft.com/office/powerpoint/2010/main" val="3473724499"/>
+      </p:ext>
+    </p:extLst>
+  </p:cSld>
+  <p:clrMapOvr>
+    <a:masterClrMapping/>
+  </p:clrMapOvr>
+</p:sld>
+</file>
+
+<file path=ppt/slides/slide2.xml><?xml version="1.0" encoding="utf-8"?>
+<p:sld xmlns:a="http://schemas.openxmlformats.org/drawingml/2006/main" xmlns:r="http://schemas.openxmlformats.org/officeDocument/2006/relationships" xmlns:p="http://schemas.openxmlformats.org/presentationml/2006/main">
+  <p:cSld>
+    <p:spTree>
+      <p:nvGrpSpPr>
+        <p:cNvPr id="1" name=""/>
+        <p:cNvGrpSpPr/>
+        <p:nvPr/>
+      </p:nvGrpSpPr>
+      <p:grpSpPr>
+        <a:xfrm>
+          <a:off x="0" y="0"/>
+          <a:ext cx="0" cy="0"/>
+          <a:chOff x="0" y="0"/>
+          <a:chExt cx="0" cy="0"/>
+        </a:xfrm>
+      </p:grpSpPr>
+      <p:pic>
+        <p:nvPicPr>
+          <p:cNvPr id="4" name="Picture 3"/>
+          <p:cNvPicPr>
+            <a:picLocks noChangeAspect="1"/>
+          </p:cNvPicPr>
+          <p:nvPr/>
+        </p:nvPicPr>
+        <p:blipFill>
+          <a:blip r:embed="rId2"/>
+          <a:stretch>
+            <a:fillRect/>
+          </a:stretch>
+        </p:blipFill>
+        <p:spPr>
+          <a:xfrm>
+            <a:off x="939800" y="0"/>
+            <a:ext cx="10293292" cy="6858000"/>
+          </a:xfrm>
+          <a:prstGeom prst="rect">
+            <a:avLst/>
+          </a:prstGeom>
+        </p:spPr>
+      </p:pic>
+      <p:pic>
+        <p:nvPicPr>
+          <p:cNvPr id="5" name="Picture 4">
+            <a:extLst>
+              <a:ext uri="{FF2B5EF4-FFF2-40B4-BE49-F238E27FC236}">
+                <a16:creationId xmlns:a16="http://schemas.microsoft.com/office/drawing/2014/main" xmlns="" id="{C107D972-7F20-8243-B009-065694479AD9}"/>
+              </a:ext>
+            </a:extLst>
+          </p:cNvPr>
+          <p:cNvPicPr>
+            <a:picLocks noChangeAspect="1"/>
+          </p:cNvPicPr>
+          <p:nvPr/>
+        </p:nvPicPr>
+        <p:blipFill>
+          <a:blip r:embed="rId3"/>
+          <a:stretch>
+            <a:fillRect/>
+          </a:stretch>
+        </p:blipFill>
+        <p:spPr>
+          <a:xfrm>
+            <a:off x="3113819" y="3900680"/>
+            <a:ext cx="474134" cy="474134"/>
+          </a:xfrm>
+          <a:prstGeom prst="rect">
+            <a:avLst/>
+          </a:prstGeom>
+        </p:spPr>
+      </p:pic>
+      <p:pic>
+        <p:nvPicPr>
+          <p:cNvPr id="6" name="Picture 5">
+            <a:extLst>
+              <a:ext uri="{FF2B5EF4-FFF2-40B4-BE49-F238E27FC236}">
+                <a16:creationId xmlns:a16="http://schemas.microsoft.com/office/drawing/2014/main" xmlns="" id="{C107D972-7F20-8243-B009-065694479AD9}"/>
+              </a:ext>
+            </a:extLst>
+          </p:cNvPr>
+          <p:cNvPicPr>
+            <a:picLocks noChangeAspect="1"/>
+          </p:cNvPicPr>
+          <p:nvPr/>
+        </p:nvPicPr>
+        <p:blipFill>
+          <a:blip r:embed="rId3"/>
+          <a:stretch>
+            <a:fillRect/>
+          </a:stretch>
+        </p:blipFill>
+        <p:spPr>
+          <a:xfrm>
+            <a:off x="4126590" y="3900680"/>
+            <a:ext cx="474134" cy="474134"/>
+          </a:xfrm>
+          <a:prstGeom prst="rect">
+            <a:avLst/>
+          </a:prstGeom>
+        </p:spPr>
+      </p:pic>
+      <p:pic>
+        <p:nvPicPr>
+          <p:cNvPr id="7" name="Picture 6">
+            <a:extLst>
+              <a:ext uri="{FF2B5EF4-FFF2-40B4-BE49-F238E27FC236}">
+                <a16:creationId xmlns:a16="http://schemas.microsoft.com/office/drawing/2014/main" xmlns="" id="{C107D972-7F20-8243-B009-065694479AD9}"/>
+              </a:ext>
+            </a:extLst>
+          </p:cNvPr>
+          <p:cNvPicPr>
+            <a:picLocks noChangeAspect="1"/>
+          </p:cNvPicPr>
+          <p:nvPr/>
+        </p:nvPicPr>
+        <p:blipFill>
+          <a:blip r:embed="rId3"/>
+          <a:stretch>
+            <a:fillRect/>
+          </a:stretch>
+        </p:blipFill>
+        <p:spPr>
+          <a:xfrm>
+            <a:off x="5153018" y="3900680"/>
+            <a:ext cx="474134" cy="474134"/>
+          </a:xfrm>
+          <a:prstGeom prst="rect">
+            <a:avLst/>
+          </a:prstGeom>
+        </p:spPr>
+      </p:pic>
+      <p:sp>
+        <p:nvSpPr>
+          <p:cNvPr id="8" name="TextBox 7">
+            <a:extLst>
+              <a:ext uri="{FF2B5EF4-FFF2-40B4-BE49-F238E27FC236}">
+                <a16:creationId xmlns:a16="http://schemas.microsoft.com/office/drawing/2014/main" xmlns="" id="{6D1E8139-A455-0041-B92D-D55B3E0E9B13}"/>
+              </a:ext>
+            </a:extLst>
+          </p:cNvPr>
+          <p:cNvSpPr txBox="1"/>
+          <p:nvPr/>
+        </p:nvSpPr>
+        <p:spPr>
+          <a:xfrm>
+            <a:off x="2335292" y="1946336"/>
+            <a:ext cx="2471859" cy="600164"/>
+          </a:xfrm>
+          <a:prstGeom prst="rect">
+            <a:avLst/>
+          </a:prstGeom>
+          <a:noFill/>
+          <a:ln>
+            <a:solidFill>
+              <a:schemeClr val="tx1"/>
+            </a:solidFill>
+            <a:prstDash val="dash"/>
+          </a:ln>
+        </p:spPr>
+        <p:txBody>
+          <a:bodyPr wrap="square" rtlCol="0">
+            <a:spAutoFit/>
+          </a:bodyPr>
+          <a:lstStyle/>
+          <a:p>
+            <a:r>
+              <a:rPr lang="en-US" sz="1100" dirty="0"/>
+              <a:t>To be created by a K8S service (Load Balancer type) via AWS cloud provider for applications</a:t>
+            </a:r>
+          </a:p>
+        </p:txBody>
+      </p:sp>
+      <p:cxnSp>
+        <p:nvCxnSpPr>
+          <p:cNvPr id="9" name="Straight Arrow Connector 8">
+            <a:extLst>
+              <a:ext uri="{FF2B5EF4-FFF2-40B4-BE49-F238E27FC236}">
+                <a16:creationId xmlns:a16="http://schemas.microsoft.com/office/drawing/2014/main" xmlns="" id="{1FAE8E44-278F-8247-99D8-D86E49D69730}"/>
+              </a:ext>
+            </a:extLst>
+          </p:cNvPr>
+          <p:cNvCxnSpPr>
+            <a:cxnSpLocks/>
+            <a:stCxn id="8" idx="3"/>
+          </p:cNvCxnSpPr>
+          <p:nvPr/>
+        </p:nvCxnSpPr>
+        <p:spPr>
+          <a:xfrm flipV="1">
+            <a:off x="4807151" y="2185312"/>
+            <a:ext cx="191193" cy="61106"/>
+          </a:xfrm>
+          <a:prstGeom prst="straightConnector1">
+            <a:avLst/>
+          </a:prstGeom>
+          <a:ln>
+            <a:tailEnd type="triangle"/>
+          </a:ln>
+        </p:spPr>
+        <p:style>
+          <a:lnRef idx="1">
+            <a:schemeClr val="accent1"/>
+          </a:lnRef>
+          <a:fillRef idx="0">
+            <a:schemeClr val="accent1"/>
+          </a:fillRef>
+          <a:effectRef idx="0">
+            <a:schemeClr val="accent1"/>
+          </a:effectRef>
+          <a:fontRef idx="minor">
+            <a:schemeClr val="tx1"/>
+          </a:fontRef>
+        </p:style>
+      </p:cxnSp>
+    </p:spTree>
+    <p:extLst>
+      <p:ext uri="{BB962C8B-B14F-4D97-AF65-F5344CB8AC3E}">
+        <p14:creationId xmlns:p14="http://schemas.microsoft.com/office/powerpoint/2010/main" val="3555314726"/>
       </p:ext>
     </p:extLst>
   </p:cSld>
@@ -3714,7 +3942,7 @@
     </a:clrScheme>
     <a:fontScheme name="Office">
       <a:majorFont>
-        <a:latin typeface="Calibri Light" panose="020F0302020204030204"/>
+        <a:latin typeface="Calibri Light"/>
         <a:ea typeface=""/>
         <a:cs typeface=""/>
         <a:font script="Jpan" typeface="游ゴシック Light"/>
@@ -3766,7 +3994,7 @@
         <a:font script="Tfng" typeface="Ebrima"/>
       </a:majorFont>
       <a:minorFont>
-        <a:latin typeface="Calibri" panose="020F0502020204030204"/>
+        <a:latin typeface="Calibri"/>
         <a:ea typeface=""/>
         <a:cs typeface=""/>
         <a:font script="Jpan" typeface="游ゴシック"/>
@@ -3960,7 +4188,7 @@
   <a:extraClrSchemeLst/>
   <a:extLst>
     <a:ext uri="{05A4C25C-085E-4340-85A3-A5531E510DB2}">
-      <thm15:themeFamily xmlns:thm15="http://schemas.microsoft.com/office/thememl/2012/main" name="Office Theme" id="{62F939B6-93AF-4DB8-9C6B-D6C7DFDC589F}" vid="{4A3C46E8-61CC-4603-A589-7422A47A8E4A}"/>
+      <thm15:themeFamily xmlns:thm15="http://schemas.microsoft.com/office/thememl/2012/main" xmlns="" name="Office Theme" id="{62F939B6-93AF-4DB8-9C6B-D6C7DFDC589F}" vid="{4A3C46E8-61CC-4603-A589-7422A47A8E4A}"/>
     </a:ext>
   </a:extLst>
 </a:theme>

</xml_diff>